<commit_message>
Editing the methods section.
</commit_message>
<xml_diff>
--- a/images/Chemical and concentration exergy5MKH.pptx
+++ b/images/Chemical and concentration exergy5MKH.pptx
@@ -197,7 +197,7 @@
           <a:p>
             <a:fld id="{AEC94C19-F8E1-407D-9A13-8EE8A289FCE7}" type="datetimeFigureOut">
               <a:rPr lang="pt-PT" smtClean="0"/>
-              <a:t>24/09/25</a:t>
+              <a:t>08/10/25</a:t>
             </a:fld>
             <a:endParaRPr lang="pt-PT"/>
           </a:p>
@@ -614,7 +614,7 @@
           <a:p>
             <a:fld id="{75F4C623-C547-4EB0-929C-8831E9E0EB0A}" type="datetimeFigureOut">
               <a:rPr lang="pt-PT" smtClean="0"/>
-              <a:t>24/09/25</a:t>
+              <a:t>08/10/25</a:t>
             </a:fld>
             <a:endParaRPr lang="pt-PT"/>
           </a:p>
@@ -814,7 +814,7 @@
           <a:p>
             <a:fld id="{75F4C623-C547-4EB0-929C-8831E9E0EB0A}" type="datetimeFigureOut">
               <a:rPr lang="pt-PT" smtClean="0"/>
-              <a:t>24/09/25</a:t>
+              <a:t>08/10/25</a:t>
             </a:fld>
             <a:endParaRPr lang="pt-PT"/>
           </a:p>
@@ -1024,7 +1024,7 @@
           <a:p>
             <a:fld id="{75F4C623-C547-4EB0-929C-8831E9E0EB0A}" type="datetimeFigureOut">
               <a:rPr lang="pt-PT" smtClean="0"/>
-              <a:t>24/09/25</a:t>
+              <a:t>08/10/25</a:t>
             </a:fld>
             <a:endParaRPr lang="pt-PT"/>
           </a:p>
@@ -1224,7 +1224,7 @@
           <a:p>
             <a:fld id="{75F4C623-C547-4EB0-929C-8831E9E0EB0A}" type="datetimeFigureOut">
               <a:rPr lang="pt-PT" smtClean="0"/>
-              <a:t>24/09/25</a:t>
+              <a:t>08/10/25</a:t>
             </a:fld>
             <a:endParaRPr lang="pt-PT"/>
           </a:p>
@@ -1500,7 +1500,7 @@
           <a:p>
             <a:fld id="{75F4C623-C547-4EB0-929C-8831E9E0EB0A}" type="datetimeFigureOut">
               <a:rPr lang="pt-PT" smtClean="0"/>
-              <a:t>24/09/25</a:t>
+              <a:t>08/10/25</a:t>
             </a:fld>
             <a:endParaRPr lang="pt-PT"/>
           </a:p>
@@ -1768,7 +1768,7 @@
           <a:p>
             <a:fld id="{75F4C623-C547-4EB0-929C-8831E9E0EB0A}" type="datetimeFigureOut">
               <a:rPr lang="pt-PT" smtClean="0"/>
-              <a:t>24/09/25</a:t>
+              <a:t>08/10/25</a:t>
             </a:fld>
             <a:endParaRPr lang="pt-PT"/>
           </a:p>
@@ -2183,7 +2183,7 @@
           <a:p>
             <a:fld id="{75F4C623-C547-4EB0-929C-8831E9E0EB0A}" type="datetimeFigureOut">
               <a:rPr lang="pt-PT" smtClean="0"/>
-              <a:t>24/09/25</a:t>
+              <a:t>08/10/25</a:t>
             </a:fld>
             <a:endParaRPr lang="pt-PT"/>
           </a:p>
@@ -2325,7 +2325,7 @@
           <a:p>
             <a:fld id="{75F4C623-C547-4EB0-929C-8831E9E0EB0A}" type="datetimeFigureOut">
               <a:rPr lang="pt-PT" smtClean="0"/>
-              <a:t>24/09/25</a:t>
+              <a:t>08/10/25</a:t>
             </a:fld>
             <a:endParaRPr lang="pt-PT"/>
           </a:p>
@@ -2438,7 +2438,7 @@
           <a:p>
             <a:fld id="{75F4C623-C547-4EB0-929C-8831E9E0EB0A}" type="datetimeFigureOut">
               <a:rPr lang="pt-PT" smtClean="0"/>
-              <a:t>24/09/25</a:t>
+              <a:t>08/10/25</a:t>
             </a:fld>
             <a:endParaRPr lang="pt-PT"/>
           </a:p>
@@ -2751,7 +2751,7 @@
           <a:p>
             <a:fld id="{75F4C623-C547-4EB0-929C-8831E9E0EB0A}" type="datetimeFigureOut">
               <a:rPr lang="pt-PT" smtClean="0"/>
-              <a:t>24/09/25</a:t>
+              <a:t>08/10/25</a:t>
             </a:fld>
             <a:endParaRPr lang="pt-PT"/>
           </a:p>
@@ -3040,7 +3040,7 @@
           <a:p>
             <a:fld id="{75F4C623-C547-4EB0-929C-8831E9E0EB0A}" type="datetimeFigureOut">
               <a:rPr lang="pt-PT" smtClean="0"/>
-              <a:t>24/09/25</a:t>
+              <a:t>08/10/25</a:t>
             </a:fld>
             <a:endParaRPr lang="pt-PT"/>
           </a:p>
@@ -3283,7 +3283,7 @@
           <a:p>
             <a:fld id="{75F4C623-C547-4EB0-929C-8831E9E0EB0A}" type="datetimeFigureOut">
               <a:rPr lang="pt-PT" smtClean="0"/>
-              <a:t>24/09/25</a:t>
+              <a:t>08/10/25</a:t>
             </a:fld>
             <a:endParaRPr lang="pt-PT"/>
           </a:p>
@@ -3808,8 +3808,8 @@
         </p:nvSpPr>
         <p:spPr>
           <a:xfrm rot="16200000">
-            <a:off x="191868" y="3559242"/>
-            <a:ext cx="1392382" cy="369332"/>
+            <a:off x="-874789" y="3365420"/>
+            <a:ext cx="3636536" cy="369332"/>
           </a:xfrm>
           <a:prstGeom prst="rect">
             <a:avLst/>
@@ -3824,8 +3824,48 @@
           <a:p>
             <a:pPr algn="ctr"/>
             <a:r>
+              <a:rPr lang="en-GB"/>
+              <a:t>Mixture exergy </a:t>
+            </a:r>
+            <a:r>
               <a:rPr lang="en-GB" dirty="0"/>
-              <a:t>Exergy</a:t>
+              <a:t>(</a:t>
+            </a:r>
+            <a:r>
+              <a:rPr lang="en-GB" i="1" dirty="0"/>
+              <a:t>b</a:t>
+            </a:r>
+            <a:r>
+              <a:rPr lang="en-GB" i="1" baseline="-25000" dirty="0"/>
+              <a:t>m</a:t>
+            </a:r>
+            <a:r>
+              <a:rPr lang="en-GB" dirty="0"/>
+              <a:t>) [</a:t>
+            </a:r>
+            <a:r>
+              <a:rPr lang="en-GB" dirty="0" err="1"/>
+              <a:t>kJ</a:t>
+            </a:r>
+            <a:r>
+              <a:rPr lang="en-GB" baseline="-25000" dirty="0" err="1"/>
+              <a:t>m</a:t>
+            </a:r>
+            <a:r>
+              <a:rPr lang="en-GB" dirty="0"/>
+              <a:t>/</a:t>
+            </a:r>
+            <a:r>
+              <a:rPr lang="en-GB" dirty="0" err="1"/>
+              <a:t>mol</a:t>
+            </a:r>
+            <a:r>
+              <a:rPr lang="en-GB" baseline="-25000" dirty="0" err="1"/>
+              <a:t>m</a:t>
+            </a:r>
+            <a:r>
+              <a:rPr lang="en-GB" dirty="0"/>
+              <a:t>]</a:t>
             </a:r>
             <a:endParaRPr lang="pt-PT" dirty="0"/>
           </a:p>

</xml_diff>